<commit_message>
Fixed page5 is method Get
</commit_message>
<xml_diff>
--- a/doc/Todo.pptx
+++ b/doc/Todo.pptx
@@ -267,7 +267,7 @@
           <a:p>
             <a:fld id="{2C237B7F-46F1-D640-8998-AC68C5BC49AA}" type="datetimeFigureOut">
               <a:rPr kumimoji="1" lang="ja-JP" altLang="en-US" smtClean="0"/>
-              <a:t>2023/10/23</a:t>
+              <a:t>2023/10/24</a:t>
             </a:fld>
             <a:endParaRPr kumimoji="1" lang="ja-JP" altLang="en-US"/>
           </a:p>
@@ -497,7 +497,7 @@
           <a:p>
             <a:fld id="{2C237B7F-46F1-D640-8998-AC68C5BC49AA}" type="datetimeFigureOut">
               <a:rPr kumimoji="1" lang="ja-JP" altLang="en-US" smtClean="0"/>
-              <a:t>2023/10/23</a:t>
+              <a:t>2023/10/24</a:t>
             </a:fld>
             <a:endParaRPr kumimoji="1" lang="ja-JP" altLang="en-US"/>
           </a:p>
@@ -737,7 +737,7 @@
           <a:p>
             <a:fld id="{2C237B7F-46F1-D640-8998-AC68C5BC49AA}" type="datetimeFigureOut">
               <a:rPr kumimoji="1" lang="ja-JP" altLang="en-US" smtClean="0"/>
-              <a:t>2023/10/23</a:t>
+              <a:t>2023/10/24</a:t>
             </a:fld>
             <a:endParaRPr kumimoji="1" lang="ja-JP" altLang="en-US"/>
           </a:p>
@@ -967,7 +967,7 @@
           <a:p>
             <a:fld id="{2C237B7F-46F1-D640-8998-AC68C5BC49AA}" type="datetimeFigureOut">
               <a:rPr kumimoji="1" lang="ja-JP" altLang="en-US" smtClean="0"/>
-              <a:t>2023/10/23</a:t>
+              <a:t>2023/10/24</a:t>
             </a:fld>
             <a:endParaRPr kumimoji="1" lang="ja-JP" altLang="en-US"/>
           </a:p>
@@ -1242,7 +1242,7 @@
           <a:p>
             <a:fld id="{2C237B7F-46F1-D640-8998-AC68C5BC49AA}" type="datetimeFigureOut">
               <a:rPr kumimoji="1" lang="ja-JP" altLang="en-US" smtClean="0"/>
-              <a:t>2023/10/23</a:t>
+              <a:t>2023/10/24</a:t>
             </a:fld>
             <a:endParaRPr kumimoji="1" lang="ja-JP" altLang="en-US"/>
           </a:p>
@@ -1571,7 +1571,7 @@
           <a:p>
             <a:fld id="{2C237B7F-46F1-D640-8998-AC68C5BC49AA}" type="datetimeFigureOut">
               <a:rPr kumimoji="1" lang="ja-JP" altLang="en-US" smtClean="0"/>
-              <a:t>2023/10/23</a:t>
+              <a:t>2023/10/24</a:t>
             </a:fld>
             <a:endParaRPr kumimoji="1" lang="ja-JP" altLang="en-US"/>
           </a:p>
@@ -2047,7 +2047,7 @@
           <a:p>
             <a:fld id="{2C237B7F-46F1-D640-8998-AC68C5BC49AA}" type="datetimeFigureOut">
               <a:rPr kumimoji="1" lang="ja-JP" altLang="en-US" smtClean="0"/>
-              <a:t>2023/10/23</a:t>
+              <a:t>2023/10/24</a:t>
             </a:fld>
             <a:endParaRPr kumimoji="1" lang="ja-JP" altLang="en-US"/>
           </a:p>
@@ -2188,7 +2188,7 @@
           <a:p>
             <a:fld id="{2C237B7F-46F1-D640-8998-AC68C5BC49AA}" type="datetimeFigureOut">
               <a:rPr kumimoji="1" lang="ja-JP" altLang="en-US" smtClean="0"/>
-              <a:t>2023/10/23</a:t>
+              <a:t>2023/10/24</a:t>
             </a:fld>
             <a:endParaRPr kumimoji="1" lang="ja-JP" altLang="en-US"/>
           </a:p>
@@ -2301,7 +2301,7 @@
           <a:p>
             <a:fld id="{2C237B7F-46F1-D640-8998-AC68C5BC49AA}" type="datetimeFigureOut">
               <a:rPr kumimoji="1" lang="ja-JP" altLang="en-US" smtClean="0"/>
-              <a:t>2023/10/23</a:t>
+              <a:t>2023/10/24</a:t>
             </a:fld>
             <a:endParaRPr kumimoji="1" lang="ja-JP" altLang="en-US"/>
           </a:p>
@@ -2644,7 +2644,7 @@
           <a:p>
             <a:fld id="{2C237B7F-46F1-D640-8998-AC68C5BC49AA}" type="datetimeFigureOut">
               <a:rPr kumimoji="1" lang="ja-JP" altLang="en-US" smtClean="0"/>
-              <a:t>2023/10/23</a:t>
+              <a:t>2023/10/24</a:t>
             </a:fld>
             <a:endParaRPr kumimoji="1" lang="ja-JP" altLang="en-US"/>
           </a:p>
@@ -2932,7 +2932,7 @@
           <a:p>
             <a:fld id="{2C237B7F-46F1-D640-8998-AC68C5BC49AA}" type="datetimeFigureOut">
               <a:rPr kumimoji="1" lang="ja-JP" altLang="en-US" smtClean="0"/>
-              <a:t>2023/10/23</a:t>
+              <a:t>2023/10/24</a:t>
             </a:fld>
             <a:endParaRPr kumimoji="1" lang="ja-JP" altLang="en-US"/>
           </a:p>
@@ -3205,7 +3205,7 @@
           <a:p>
             <a:fld id="{2C237B7F-46F1-D640-8998-AC68C5BC49AA}" type="datetimeFigureOut">
               <a:rPr kumimoji="1" lang="ja-JP" altLang="en-US" smtClean="0"/>
-              <a:t>2023/10/23</a:t>
+              <a:t>2023/10/24</a:t>
             </a:fld>
             <a:endParaRPr kumimoji="1" lang="ja-JP" altLang="en-US"/>
           </a:p>
@@ -5625,7 +5625,15 @@
             </a:r>
             <a:r>
               <a:rPr lang="en-US" altLang="ja-JP" dirty="0"/>
-              <a:t>)	/todo/		POST		JSON</a:t>
+              <a:t>)	/todo/	</a:t>
+            </a:r>
+            <a:r>
+              <a:rPr lang="en-US" altLang="ja-JP"/>
+              <a:t>	GET</a:t>
+            </a:r>
+            <a:r>
+              <a:rPr lang="en-US" altLang="ja-JP" dirty="0"/>
+              <a:t>		JSON</a:t>
             </a:r>
             <a:r>
               <a:rPr lang="ja-JP" altLang="en-US"/>

</xml_diff>